<commit_message>
Mise à jour des codes d'example (fournis par Micka & Virgile)
</commit_message>
<xml_diff>
--- a/design/Présentation GSF.pptx
+++ b/design/Présentation GSF.pptx
@@ -223,7 +223,7 @@
           <a:p>
             <a:fld id="{0B3D5B45-06E5-4755-A2B1-924E538CE1B1}" type="datetimeFigureOut">
               <a:rPr lang="fr-FR" smtClean="0"/>
-              <a:t>25/02/2020</a:t>
+              <a:t>26/02/2020</a:t>
             </a:fld>
             <a:endParaRPr lang="fr-FR"/>
           </a:p>
@@ -880,7 +880,7 @@
           <a:p>
             <a:fld id="{E95D520C-4E3C-40AE-8B1C-9F4B28BB9FC5}" type="datetime1">
               <a:rPr lang="fr-FR" smtClean="0"/>
-              <a:t>25/02/2020</a:t>
+              <a:t>26/02/2020</a:t>
             </a:fld>
             <a:endParaRPr lang="fr-FR"/>
           </a:p>
@@ -1073,7 +1073,7 @@
           <a:p>
             <a:fld id="{86243FD9-D5F9-43D2-AF62-4F08FCB611A0}" type="datetime1">
               <a:rPr lang="fr-FR" smtClean="0"/>
-              <a:t>25/02/2020</a:t>
+              <a:t>26/02/2020</a:t>
             </a:fld>
             <a:endParaRPr lang="fr-FR"/>
           </a:p>
@@ -1256,7 +1256,7 @@
           <a:p>
             <a:fld id="{ADF0FAD2-E648-4972-A146-60858457D476}" type="datetime1">
               <a:rPr lang="fr-FR" smtClean="0"/>
-              <a:t>25/02/2020</a:t>
+              <a:t>26/02/2020</a:t>
             </a:fld>
             <a:endParaRPr lang="fr-FR"/>
           </a:p>
@@ -1429,7 +1429,7 @@
           <a:p>
             <a:fld id="{F0DFCE70-8A5A-4F01-B1B2-3E8C261F4F56}" type="datetime1">
               <a:rPr lang="fr-FR" smtClean="0"/>
-              <a:t>25/02/2020</a:t>
+              <a:t>26/02/2020</a:t>
             </a:fld>
             <a:endParaRPr lang="fr-FR"/>
           </a:p>
@@ -1688,7 +1688,7 @@
           <a:p>
             <a:fld id="{3A3E7D37-48AC-4C58-90BB-C0BFF2C60E94}" type="datetime1">
               <a:rPr lang="fr-FR" smtClean="0"/>
-              <a:t>25/02/2020</a:t>
+              <a:t>26/02/2020</a:t>
             </a:fld>
             <a:endParaRPr lang="fr-FR"/>
           </a:p>
@@ -1979,7 +1979,7 @@
           <a:p>
             <a:fld id="{15EF750F-3CA4-4920-BF20-A88B0BBE9675}" type="datetime1">
               <a:rPr lang="fr-FR" smtClean="0"/>
-              <a:t>25/02/2020</a:t>
+              <a:t>26/02/2020</a:t>
             </a:fld>
             <a:endParaRPr lang="fr-FR"/>
           </a:p>
@@ -2420,7 +2420,7 @@
           <a:p>
             <a:fld id="{48A64067-D811-4567-A4AE-FF1FDEC0C043}" type="datetime1">
               <a:rPr lang="fr-FR" smtClean="0"/>
-              <a:t>25/02/2020</a:t>
+              <a:t>26/02/2020</a:t>
             </a:fld>
             <a:endParaRPr lang="fr-FR"/>
           </a:p>
@@ -2541,7 +2541,7 @@
           <a:p>
             <a:fld id="{AB3E7226-04CE-46A0-9044-DAFA36746AB0}" type="datetime1">
               <a:rPr lang="fr-FR" smtClean="0"/>
-              <a:t>25/02/2020</a:t>
+              <a:t>26/02/2020</a:t>
             </a:fld>
             <a:endParaRPr lang="fr-FR"/>
           </a:p>
@@ -2639,7 +2639,7 @@
           <a:p>
             <a:fld id="{39701335-BCA7-4BB8-A6A5-06252DB03E79}" type="datetime1">
               <a:rPr lang="fr-FR" smtClean="0"/>
-              <a:t>25/02/2020</a:t>
+              <a:t>26/02/2020</a:t>
             </a:fld>
             <a:endParaRPr lang="fr-FR"/>
           </a:p>
@@ -2998,7 +2998,7 @@
           <a:p>
             <a:fld id="{CD0560F7-2450-4003-9E0D-82454FF53FEF}" type="datetime1">
               <a:rPr lang="fr-FR" smtClean="0"/>
-              <a:t>25/02/2020</a:t>
+              <a:t>26/02/2020</a:t>
             </a:fld>
             <a:endParaRPr lang="fr-FR"/>
           </a:p>
@@ -3317,7 +3317,7 @@
           <a:p>
             <a:fld id="{416B743A-74D2-40BF-B80F-8CDB9173FE7F}" type="datetime1">
               <a:rPr lang="fr-FR" smtClean="0"/>
-              <a:t>25/02/2020</a:t>
+              <a:t>26/02/2020</a:t>
             </a:fld>
             <a:endParaRPr lang="fr-FR"/>
           </a:p>
@@ -3553,7 +3553,7 @@
           <a:p>
             <a:fld id="{E244DB60-0BD7-46E0-871D-B91865C1E1D8}" type="datetime1">
               <a:rPr lang="fr-FR" smtClean="0"/>
-              <a:t>25/02/2020</a:t>
+              <a:t>26/02/2020</a:t>
             </a:fld>
             <a:endParaRPr lang="fr-FR"/>
           </a:p>
@@ -10585,10 +10585,10 @@
         </p:nvGrpSpPr>
         <p:grpSpPr>
           <a:xfrm>
-            <a:off x="5375398" y="3135139"/>
-            <a:ext cx="1075340" cy="1217786"/>
-            <a:chOff x="7550150" y="3986322"/>
-            <a:chExt cx="1075340" cy="1178275"/>
+            <a:off x="5438170" y="3135139"/>
+            <a:ext cx="1012568" cy="1217786"/>
+            <a:chOff x="7612922" y="3986322"/>
+            <a:chExt cx="1012568" cy="1178275"/>
           </a:xfrm>
         </p:grpSpPr>
         <p:sp>
@@ -10605,7 +10605,7 @@
           </p:nvSpPr>
           <p:spPr>
             <a:xfrm>
-              <a:off x="7550150" y="4295775"/>
+              <a:off x="7612922" y="4304743"/>
               <a:ext cx="901700" cy="577850"/>
             </a:xfrm>
             <a:prstGeom prst="rect">
@@ -10659,10 +10659,10 @@
           </p:nvGrpSpPr>
           <p:grpSpPr>
             <a:xfrm>
-              <a:off x="7928634" y="3986322"/>
-              <a:ext cx="696856" cy="1178275"/>
-              <a:chOff x="7928634" y="3986322"/>
-              <a:chExt cx="696856" cy="1178275"/>
+              <a:off x="7928635" y="3986322"/>
+              <a:ext cx="696855" cy="1178275"/>
+              <a:chOff x="7928635" y="3986322"/>
+              <a:chExt cx="696855" cy="1178275"/>
             </a:xfrm>
           </p:grpSpPr>
           <p:sp>
@@ -10678,8 +10678,8 @@
               <p:nvPr/>
             </p:nvSpPr>
             <p:spPr>
-              <a:xfrm rot="16200000">
-                <a:off x="7422005" y="4492951"/>
+              <a:xfrm rot="5400000">
+                <a:off x="7422006" y="4492951"/>
                 <a:ext cx="1178275" cy="165017"/>
               </a:xfrm>
               <a:prstGeom prst="leftArrow">

</xml_diff>